<commit_message>
Update Presentacion Proyecto 2.pptx
</commit_message>
<xml_diff>
--- a/Proyecto2/Presentacion Proyecto 2.pptx
+++ b/Proyecto2/Presentacion Proyecto 2.pptx
@@ -13802,7 +13802,10 @@
           <a:bodyPr/>
           <a:lstStyle/>
           <a:p>
-            <a:endParaRPr lang="es-ES"/>
+            <a:r>
+              <a:rPr lang="es-ES"/>
+              <a:t>Fuentes</a:t>
+            </a:r>
           </a:p>
         </p:txBody>
       </p:sp>
@@ -14801,7 +14804,10 @@
           <a:bodyPr/>
           <a:lstStyle/>
           <a:p>
-            <a:endParaRPr lang="es-ES"/>
+            <a:r>
+              <a:rPr lang="es-ES" dirty="0"/>
+              <a:t>Escena “B”</a:t>
+            </a:r>
           </a:p>
         </p:txBody>
       </p:sp>
@@ -14952,7 +14958,10 @@
           <a:bodyPr/>
           <a:lstStyle/>
           <a:p>
-            <a:endParaRPr lang="es-ES"/>
+            <a:r>
+              <a:rPr lang="es-ES" dirty="0"/>
+              <a:t>Escena “B”</a:t>
+            </a:r>
           </a:p>
         </p:txBody>
       </p:sp>

</xml_diff>